<commit_message>
update td parsing slides
</commit_message>
<xml_diff>
--- a/assets/ppt/parsing/td1-recursive-descent.pptx
+++ b/assets/ppt/parsing/td1-recursive-descent.pptx
@@ -260,7 +260,7 @@
           <a:p>
             <a:fld id="{0DDE2897-DA21-3E4F-B539-E8F5D4B26403}" type="datetimeFigureOut">
               <a:rPr lang="en-US" smtClean="0"/>
-              <a:t>7/4/19</a:t>
+              <a:t>7/11/19</a:t>
             </a:fld>
             <a:endParaRPr lang="en-US"/>
           </a:p>
@@ -10184,7 +10184,7 @@
           <a:p>
             <a:r>
               <a:rPr lang="en-CA" dirty="0"/>
-              <a:t>Intro t0 Top-Down Parsing</a:t>
+              <a:t>Top-Down Parsing</a:t>
             </a:r>
           </a:p>
         </p:txBody>

</xml_diff>